<commit_message>
Slight change in slides and add contact
Change-Id: I48c20e270dce165ba0056b67d7a5ffe8faffff95
</commit_message>
<xml_diff>
--- a/docs/Naming-Packets.pptx
+++ b/docs/Naming-Packets.pptx
@@ -249,7 +249,7 @@
           <a:p>
             <a:fld id="{0B87196E-1ED8-4C43-AA47-B5ED35E1DED7}" type="datetimeFigureOut">
               <a:rPr lang="en-US" smtClean="0"/>
-              <a:t>5/8/17</a:t>
+              <a:t>6/7/17</a:t>
             </a:fld>
             <a:endParaRPr lang="en-US"/>
           </a:p>
@@ -419,7 +419,7 @@
           <a:p>
             <a:fld id="{0B87196E-1ED8-4C43-AA47-B5ED35E1DED7}" type="datetimeFigureOut">
               <a:rPr lang="en-US" smtClean="0"/>
-              <a:t>5/8/17</a:t>
+              <a:t>6/7/17</a:t>
             </a:fld>
             <a:endParaRPr lang="en-US"/>
           </a:p>
@@ -599,7 +599,7 @@
           <a:p>
             <a:fld id="{0B87196E-1ED8-4C43-AA47-B5ED35E1DED7}" type="datetimeFigureOut">
               <a:rPr lang="en-US" smtClean="0"/>
-              <a:t>5/8/17</a:t>
+              <a:t>6/7/17</a:t>
             </a:fld>
             <a:endParaRPr lang="en-US"/>
           </a:p>
@@ -769,7 +769,7 @@
           <a:p>
             <a:fld id="{0B87196E-1ED8-4C43-AA47-B5ED35E1DED7}" type="datetimeFigureOut">
               <a:rPr lang="en-US" smtClean="0"/>
-              <a:t>5/8/17</a:t>
+              <a:t>6/7/17</a:t>
             </a:fld>
             <a:endParaRPr lang="en-US"/>
           </a:p>
@@ -1015,7 +1015,7 @@
           <a:p>
             <a:fld id="{0B87196E-1ED8-4C43-AA47-B5ED35E1DED7}" type="datetimeFigureOut">
               <a:rPr lang="en-US" smtClean="0"/>
-              <a:t>5/8/17</a:t>
+              <a:t>6/7/17</a:t>
             </a:fld>
             <a:endParaRPr lang="en-US"/>
           </a:p>
@@ -1247,7 +1247,7 @@
           <a:p>
             <a:fld id="{0B87196E-1ED8-4C43-AA47-B5ED35E1DED7}" type="datetimeFigureOut">
               <a:rPr lang="en-US" smtClean="0"/>
-              <a:t>5/8/17</a:t>
+              <a:t>6/7/17</a:t>
             </a:fld>
             <a:endParaRPr lang="en-US"/>
           </a:p>
@@ -1614,7 +1614,7 @@
           <a:p>
             <a:fld id="{0B87196E-1ED8-4C43-AA47-B5ED35E1DED7}" type="datetimeFigureOut">
               <a:rPr lang="en-US" smtClean="0"/>
-              <a:t>5/8/17</a:t>
+              <a:t>6/7/17</a:t>
             </a:fld>
             <a:endParaRPr lang="en-US"/>
           </a:p>
@@ -1732,7 +1732,7 @@
           <a:p>
             <a:fld id="{0B87196E-1ED8-4C43-AA47-B5ED35E1DED7}" type="datetimeFigureOut">
               <a:rPr lang="en-US" smtClean="0"/>
-              <a:t>5/8/17</a:t>
+              <a:t>6/7/17</a:t>
             </a:fld>
             <a:endParaRPr lang="en-US"/>
           </a:p>
@@ -1827,7 +1827,7 @@
           <a:p>
             <a:fld id="{0B87196E-1ED8-4C43-AA47-B5ED35E1DED7}" type="datetimeFigureOut">
               <a:rPr lang="en-US" smtClean="0"/>
-              <a:t>5/8/17</a:t>
+              <a:t>6/7/17</a:t>
             </a:fld>
             <a:endParaRPr lang="en-US"/>
           </a:p>
@@ -2104,7 +2104,7 @@
           <a:p>
             <a:fld id="{0B87196E-1ED8-4C43-AA47-B5ED35E1DED7}" type="datetimeFigureOut">
               <a:rPr lang="en-US" smtClean="0"/>
-              <a:t>5/8/17</a:t>
+              <a:t>6/7/17</a:t>
             </a:fld>
             <a:endParaRPr lang="en-US"/>
           </a:p>
@@ -2357,7 +2357,7 @@
           <a:p>
             <a:fld id="{0B87196E-1ED8-4C43-AA47-B5ED35E1DED7}" type="datetimeFigureOut">
               <a:rPr lang="en-US" smtClean="0"/>
-              <a:t>5/8/17</a:t>
+              <a:t>6/7/17</a:t>
             </a:fld>
             <a:endParaRPr lang="en-US"/>
           </a:p>
@@ -2570,7 +2570,7 @@
           <a:p>
             <a:fld id="{0B87196E-1ED8-4C43-AA47-B5ED35E1DED7}" type="datetimeFigureOut">
               <a:rPr lang="en-US" smtClean="0"/>
-              <a:t>5/8/17</a:t>
+              <a:t>6/7/17</a:t>
             </a:fld>
             <a:endParaRPr lang="en-US"/>
           </a:p>
@@ -3230,11 +3230,7 @@
             </a:pPr>
             <a:r>
               <a:rPr lang="en-US" sz="2000" b="1" dirty="0" smtClean="0"/>
-              <a:t>Token </a:t>
-            </a:r>
-            <a:r>
-              <a:rPr lang="en-US" sz="2000" b="1" dirty="0" smtClean="0"/>
-              <a:t>issuer</a:t>
+              <a:t>Token issuer</a:t>
             </a:r>
           </a:p>
           <a:p>
@@ -3561,15 +3557,7 @@
           <a:p>
             <a:r>
               <a:rPr lang="en-US" dirty="0" smtClean="0"/>
-              <a:t>Consumer send a command interest /</a:t>
-            </a:r>
-            <a:r>
-              <a:rPr lang="en-US" dirty="0" smtClean="0"/>
-              <a:t>AA-prefix/DKEY</a:t>
-            </a:r>
-            <a:r>
-              <a:rPr lang="en-US" dirty="0" smtClean="0"/>
-              <a:t>/[Token]</a:t>
+              <a:t>Consumer send a command interest /AA-prefix/DKEY/[Token]</a:t>
             </a:r>
           </a:p>
           <a:p>
@@ -3671,7 +3659,19 @@
           <a:p>
             <a:r>
               <a:rPr lang="en-US" dirty="0" smtClean="0"/>
-              <a:t>Owner sends /Owner-prefix/Producer-prefix/POLICY/policy-string/[sig]</a:t>
+              <a:t>Owner sends </a:t>
+            </a:r>
+            <a:r>
+              <a:rPr lang="en-US" smtClean="0"/>
+              <a:t>/</a:t>
+            </a:r>
+            <a:r>
+              <a:rPr lang="en-US" smtClean="0"/>
+              <a:t>Owner-prefix/SET_POLICY/Producer-prefix/policy-string</a:t>
+            </a:r>
+            <a:r>
+              <a:rPr lang="en-US" dirty="0" smtClean="0"/>
+              <a:t>/[sig]</a:t>
             </a:r>
           </a:p>
           <a:p>

</xml_diff>